<commit_message>
Update Du papier au numérique la gestion des caractères grecs ligaturés_v4horizon.pptx
</commit_message>
<xml_diff>
--- a/JE/Du papier au numérique la gestion des caractères grecs ligaturés_v4horizon.pptx
+++ b/JE/Du papier au numérique la gestion des caractères grecs ligaturés_v4horizon.pptx
@@ -243,7 +243,7 @@
           <a:p>
             <a:fld id="{3BD5C212-487B-6C4F-B1DA-B19548653D45}" type="datetimeFigureOut">
               <a:rPr lang="fr-FR" smtClean="0"/>
-              <a:t>08/09/2022</a:t>
+              <a:t>10/09/2022</a:t>
             </a:fld>
             <a:endParaRPr lang="fr-FR"/>
           </a:p>
@@ -285,7 +285,7 @@
           <a:p>
             <a:fld id="{34948C4F-9F29-FB44-9006-35621F635535}" type="slidenum">
               <a:rPr lang="fr-FR" smtClean="0"/>
-              <a:t>‹N°›</a:t>
+              <a:t>‹#›</a:t>
             </a:fld>
             <a:endParaRPr lang="fr-FR"/>
           </a:p>
@@ -384,7 +384,7 @@
           <a:p>
             <a:fld id="{3BD5C212-487B-6C4F-B1DA-B19548653D45}" type="datetimeFigureOut">
               <a:rPr lang="fr-FR" smtClean="0"/>
-              <a:t>08/09/2022</a:t>
+              <a:t>10/09/2022</a:t>
             </a:fld>
             <a:endParaRPr lang="fr-FR"/>
           </a:p>
@@ -426,7 +426,7 @@
           <a:p>
             <a:fld id="{34948C4F-9F29-FB44-9006-35621F635535}" type="slidenum">
               <a:rPr lang="fr-FR" smtClean="0"/>
-              <a:t>‹N°›</a:t>
+              <a:t>‹#›</a:t>
             </a:fld>
             <a:endParaRPr lang="fr-FR"/>
           </a:p>
@@ -535,7 +535,7 @@
           <a:p>
             <a:fld id="{3BD5C212-487B-6C4F-B1DA-B19548653D45}" type="datetimeFigureOut">
               <a:rPr lang="fr-FR" smtClean="0"/>
-              <a:t>08/09/2022</a:t>
+              <a:t>10/09/2022</a:t>
             </a:fld>
             <a:endParaRPr lang="fr-FR"/>
           </a:p>
@@ -577,7 +577,7 @@
           <a:p>
             <a:fld id="{34948C4F-9F29-FB44-9006-35621F635535}" type="slidenum">
               <a:rPr lang="fr-FR" smtClean="0"/>
-              <a:t>‹N°›</a:t>
+              <a:t>‹#›</a:t>
             </a:fld>
             <a:endParaRPr lang="fr-FR"/>
           </a:p>
@@ -676,7 +676,7 @@
           <a:p>
             <a:fld id="{3BD5C212-487B-6C4F-B1DA-B19548653D45}" type="datetimeFigureOut">
               <a:rPr lang="fr-FR" smtClean="0"/>
-              <a:t>08/09/2022</a:t>
+              <a:t>10/09/2022</a:t>
             </a:fld>
             <a:endParaRPr lang="fr-FR"/>
           </a:p>
@@ -718,7 +718,7 @@
           <a:p>
             <a:fld id="{34948C4F-9F29-FB44-9006-35621F635535}" type="slidenum">
               <a:rPr lang="fr-FR" smtClean="0"/>
-              <a:t>‹N°›</a:t>
+              <a:t>‹#›</a:t>
             </a:fld>
             <a:endParaRPr lang="fr-FR"/>
           </a:p>
@@ -920,7 +920,7 @@
           <a:p>
             <a:fld id="{3BD5C212-487B-6C4F-B1DA-B19548653D45}" type="datetimeFigureOut">
               <a:rPr lang="fr-FR" smtClean="0"/>
-              <a:t>08/09/2022</a:t>
+              <a:t>10/09/2022</a:t>
             </a:fld>
             <a:endParaRPr lang="fr-FR"/>
           </a:p>
@@ -962,7 +962,7 @@
           <a:p>
             <a:fld id="{34948C4F-9F29-FB44-9006-35621F635535}" type="slidenum">
               <a:rPr lang="fr-FR" smtClean="0"/>
-              <a:t>‹N°›</a:t>
+              <a:t>‹#›</a:t>
             </a:fld>
             <a:endParaRPr lang="fr-FR"/>
           </a:p>
@@ -1099,7 +1099,7 @@
           <a:p>
             <a:fld id="{3BD5C212-487B-6C4F-B1DA-B19548653D45}" type="datetimeFigureOut">
               <a:rPr lang="fr-FR" smtClean="0"/>
-              <a:t>08/09/2022</a:t>
+              <a:t>10/09/2022</a:t>
             </a:fld>
             <a:endParaRPr lang="fr-FR"/>
           </a:p>
@@ -1141,7 +1141,7 @@
           <a:p>
             <a:fld id="{34948C4F-9F29-FB44-9006-35621F635535}" type="slidenum">
               <a:rPr lang="fr-FR" smtClean="0"/>
-              <a:t>‹N°›</a:t>
+              <a:t>‹#›</a:t>
             </a:fld>
             <a:endParaRPr lang="fr-FR"/>
           </a:p>
@@ -1423,7 +1423,7 @@
           <a:p>
             <a:fld id="{3BD5C212-487B-6C4F-B1DA-B19548653D45}" type="datetimeFigureOut">
               <a:rPr lang="fr-FR" smtClean="0"/>
-              <a:t>08/09/2022</a:t>
+              <a:t>10/09/2022</a:t>
             </a:fld>
             <a:endParaRPr lang="fr-FR"/>
           </a:p>
@@ -1465,7 +1465,7 @@
           <a:p>
             <a:fld id="{34948C4F-9F29-FB44-9006-35621F635535}" type="slidenum">
               <a:rPr lang="fr-FR" smtClean="0"/>
-              <a:t>‹N°›</a:t>
+              <a:t>‹#›</a:t>
             </a:fld>
             <a:endParaRPr lang="fr-FR"/>
           </a:p>
@@ -1536,7 +1536,7 @@
           <a:p>
             <a:fld id="{3BD5C212-487B-6C4F-B1DA-B19548653D45}" type="datetimeFigureOut">
               <a:rPr lang="fr-FR" smtClean="0"/>
-              <a:t>08/09/2022</a:t>
+              <a:t>10/09/2022</a:t>
             </a:fld>
             <a:endParaRPr lang="fr-FR"/>
           </a:p>
@@ -1578,7 +1578,7 @@
           <a:p>
             <a:fld id="{34948C4F-9F29-FB44-9006-35621F635535}" type="slidenum">
               <a:rPr lang="fr-FR" smtClean="0"/>
-              <a:t>‹N°›</a:t>
+              <a:t>‹#›</a:t>
             </a:fld>
             <a:endParaRPr lang="fr-FR"/>
           </a:p>
@@ -1626,7 +1626,7 @@
           <a:p>
             <a:fld id="{3BD5C212-487B-6C4F-B1DA-B19548653D45}" type="datetimeFigureOut">
               <a:rPr lang="fr-FR" smtClean="0"/>
-              <a:t>08/09/2022</a:t>
+              <a:t>10/09/2022</a:t>
             </a:fld>
             <a:endParaRPr lang="fr-FR"/>
           </a:p>
@@ -1668,7 +1668,7 @@
           <a:p>
             <a:fld id="{34948C4F-9F29-FB44-9006-35621F635535}" type="slidenum">
               <a:rPr lang="fr-FR" smtClean="0"/>
-              <a:t>‹N°›</a:t>
+              <a:t>‹#›</a:t>
             </a:fld>
             <a:endParaRPr lang="fr-FR"/>
           </a:p>
@@ -1879,7 +1879,7 @@
           <a:p>
             <a:fld id="{3BD5C212-487B-6C4F-B1DA-B19548653D45}" type="datetimeFigureOut">
               <a:rPr lang="fr-FR" smtClean="0"/>
-              <a:t>08/09/2022</a:t>
+              <a:t>10/09/2022</a:t>
             </a:fld>
             <a:endParaRPr lang="fr-FR"/>
           </a:p>
@@ -1921,7 +1921,7 @@
           <a:p>
             <a:fld id="{34948C4F-9F29-FB44-9006-35621F635535}" type="slidenum">
               <a:rPr lang="fr-FR" smtClean="0"/>
-              <a:t>‹N°›</a:t>
+              <a:t>‹#›</a:t>
             </a:fld>
             <a:endParaRPr lang="fr-FR"/>
           </a:p>
@@ -2136,7 +2136,7 @@
           <a:p>
             <a:fld id="{3BD5C212-487B-6C4F-B1DA-B19548653D45}" type="datetimeFigureOut">
               <a:rPr lang="fr-FR" smtClean="0"/>
-              <a:t>08/09/2022</a:t>
+              <a:t>10/09/2022</a:t>
             </a:fld>
             <a:endParaRPr lang="fr-FR"/>
           </a:p>
@@ -2178,7 +2178,7 @@
           <a:p>
             <a:fld id="{34948C4F-9F29-FB44-9006-35621F635535}" type="slidenum">
               <a:rPr lang="fr-FR" smtClean="0"/>
-              <a:t>‹N°›</a:t>
+              <a:t>‹#›</a:t>
             </a:fld>
             <a:endParaRPr lang="fr-FR"/>
           </a:p>
@@ -2320,7 +2320,7 @@
           <a:p>
             <a:fld id="{3BD5C212-487B-6C4F-B1DA-B19548653D45}" type="datetimeFigureOut">
               <a:rPr lang="fr-FR" smtClean="0"/>
-              <a:t>08/09/2022</a:t>
+              <a:t>10/09/2022</a:t>
             </a:fld>
             <a:endParaRPr lang="fr-FR"/>
           </a:p>
@@ -2398,7 +2398,7 @@
           <a:p>
             <a:fld id="{34948C4F-9F29-FB44-9006-35621F635535}" type="slidenum">
               <a:rPr lang="fr-FR" smtClean="0"/>
-              <a:t>‹N°›</a:t>
+              <a:t>‹#›</a:t>
             </a:fld>
             <a:endParaRPr lang="fr-FR"/>
           </a:p>
@@ -2797,17 +2797,7 @@
                 <a:latin typeface="Helvetica" panose="020B0604020202020204" pitchFamily="34" charset="0"/>
                 <a:cs typeface="Helvetica" panose="020B0604020202020204" pitchFamily="34" charset="0"/>
               </a:rPr>
-              <a:t>Du papier au numérique : l'évolution des caractères grecs dans les dictionnaires médicaux (XVIIe-XVIIIe siècles</a:t>
-            </a:r>
-            <a:r>
-              <a:rPr lang="fr-FR" sz="4800" dirty="0" smtClean="0">
-                <a:solidFill>
-                  <a:prstClr val="black"/>
-                </a:solidFill>
-                <a:latin typeface="Helvetica" panose="020B0604020202020204" pitchFamily="34" charset="0"/>
-                <a:cs typeface="Helvetica" panose="020B0604020202020204" pitchFamily="34" charset="0"/>
-              </a:rPr>
-              <a:t>)</a:t>
+              <a:t>Du papier au numérique : l'évolution des caractères grecs dans les dictionnaires médicaux (XVIIe-XVIIIe siècles)</a:t>
             </a:r>
           </a:p>
           <a:p>
@@ -2815,7 +2805,7 @@
               <a:defRPr/>
             </a:pPr>
             <a:r>
-              <a:rPr kumimoji="0" lang="en-GB" sz="4200" b="0" i="0" u="none" strike="noStrike" kern="1200" cap="none" spc="0" normalizeH="0" baseline="0" noProof="0" dirty="0" smtClean="0">
+              <a:rPr kumimoji="0" lang="en-GB" sz="4200" b="0" i="0" u="none" strike="noStrike" kern="1200" cap="none" spc="0" normalizeH="0" baseline="0" noProof="0" dirty="0">
                 <a:ln>
                   <a:noFill/>
                 </a:ln>
@@ -2832,7 +2822,7 @@
               <a:t>par Anaïs C</a:t>
             </a:r>
             <a:r>
-              <a:rPr kumimoji="0" lang="en-GB" sz="4200" b="0" i="0" u="none" strike="noStrike" kern="1200" cap="small" spc="0" normalizeH="0" baseline="0" noProof="0" dirty="0" smtClean="0">
+              <a:rPr kumimoji="0" lang="en-GB" sz="4200" b="0" i="0" u="none" strike="noStrike" kern="1200" cap="small" spc="0" normalizeH="0" baseline="0" noProof="0" dirty="0">
                 <a:ln>
                   <a:noFill/>
                 </a:ln>
@@ -2849,7 +2839,7 @@
               <a:t>hambat</a:t>
             </a:r>
             <a:r>
-              <a:rPr kumimoji="0" lang="en-GB" sz="4200" b="0" i="0" u="none" strike="noStrike" kern="1200" cap="none" spc="0" normalizeH="0" baseline="0" noProof="0" dirty="0" smtClean="0">
+              <a:rPr kumimoji="0" lang="en-GB" sz="4200" b="0" i="0" u="none" strike="noStrike" kern="1200" cap="none" spc="0" normalizeH="0" baseline="0" noProof="0" dirty="0">
                 <a:ln>
                   <a:noFill/>
                 </a:ln>
@@ -2866,7 +2856,7 @@
               <a:t> et </a:t>
             </a:r>
             <a:r>
-              <a:rPr kumimoji="0" lang="en-GB" sz="4200" b="0" i="0" u="none" strike="noStrike" kern="1200" cap="none" spc="0" normalizeH="0" baseline="0" noProof="0" dirty="0" err="1" smtClean="0">
+              <a:rPr kumimoji="0" lang="en-GB" sz="4200" b="0" i="0" u="none" strike="noStrike" kern="1200" cap="none" spc="0" normalizeH="0" baseline="0" noProof="0" dirty="0" err="1">
                 <a:ln>
                   <a:noFill/>
                 </a:ln>
@@ -2883,7 +2873,7 @@
               <a:t>Cahal</a:t>
             </a:r>
             <a:r>
-              <a:rPr kumimoji="0" lang="en-GB" sz="4200" b="0" i="0" u="none" strike="noStrike" kern="1200" cap="none" spc="0" normalizeH="0" baseline="0" noProof="0" dirty="0" smtClean="0">
+              <a:rPr kumimoji="0" lang="en-GB" sz="4200" b="0" i="0" u="none" strike="noStrike" kern="1200" cap="none" spc="0" normalizeH="0" baseline="0" noProof="0" dirty="0">
                 <a:ln>
                   <a:noFill/>
                 </a:ln>
@@ -2900,7 +2890,7 @@
               <a:t> T</a:t>
             </a:r>
             <a:r>
-              <a:rPr kumimoji="0" lang="en-GB" sz="4200" b="0" i="0" u="none" strike="noStrike" kern="1200" cap="small" spc="0" normalizeH="0" baseline="0" noProof="0" dirty="0" smtClean="0">
+              <a:rPr kumimoji="0" lang="en-GB" sz="4200" b="0" i="0" u="none" strike="noStrike" kern="1200" cap="small" spc="0" normalizeH="0" baseline="0" noProof="0" dirty="0">
                 <a:ln>
                   <a:noFill/>
                 </a:ln>
@@ -3034,32 +3024,18 @@
           <a:lstStyle/>
           <a:p>
             <a:r>
-              <a:rPr lang="fr-FR" sz="2400" dirty="0" err="1" smtClean="0">
+              <a:rPr lang="fr-FR" sz="2400" dirty="0" err="1">
                 <a:latin typeface="Helvetica" panose="020B0604020202020204" pitchFamily="34" charset="0"/>
                 <a:cs typeface="Helvetica" panose="020B0604020202020204" pitchFamily="34" charset="0"/>
               </a:rPr>
               <a:t>Castelli</a:t>
             </a:r>
             <a:r>
-              <a:rPr lang="fr-FR" sz="2400" dirty="0" smtClean="0">
-                <a:latin typeface="Helvetica" panose="020B0604020202020204" pitchFamily="34" charset="0"/>
-                <a:cs typeface="Helvetica" panose="020B0604020202020204" pitchFamily="34" charset="0"/>
-              </a:rPr>
-              <a:t>, 1746 [1644]</a:t>
-            </a:r>
-            <a:r>
-              <a:rPr lang="fr-FR" sz="2400" dirty="0" smtClean="0">
-                <a:latin typeface="Helvetica" panose="020B0604020202020204" pitchFamily="34" charset="0"/>
-                <a:cs typeface="Helvetica" panose="020B0604020202020204" pitchFamily="34" charset="0"/>
-              </a:rPr>
-              <a:t>, 243</a:t>
-            </a:r>
-            <a:r>
               <a:rPr lang="fr-FR" sz="2400" dirty="0">
                 <a:latin typeface="Helvetica" panose="020B0604020202020204" pitchFamily="34" charset="0"/>
                 <a:cs typeface="Helvetica" panose="020B0604020202020204" pitchFamily="34" charset="0"/>
               </a:rPr>
-              <a:t>.</a:t>
+              <a:t>, 1746 [1644], 243.</a:t>
             </a:r>
             <a:endParaRPr lang="en-GB" sz="2400" dirty="0">
               <a:latin typeface="Helvetica" panose="020B0604020202020204" pitchFamily="34" charset="0"/>
@@ -3106,7 +3082,7 @@
               </a:lnSpc>
             </a:pPr>
             <a:r>
-              <a:rPr lang="fr-FR" sz="2500" dirty="0" smtClean="0">
+              <a:rPr lang="fr-FR" sz="2500" dirty="0">
                 <a:solidFill>
                   <a:srgbClr val="000000"/>
                 </a:solidFill>
@@ -3114,17 +3090,6 @@
                 <a:cs typeface="Helvetica" panose="020B0604020202020204" pitchFamily="34" charset="0"/>
               </a:rPr>
               <a:t>Grand </a:t>
-            </a:r>
-            <a:r>
-              <a:rPr lang="fr-FR" sz="2500" dirty="0" smtClean="0">
-                <a:solidFill>
-                  <a:srgbClr val="000000"/>
-                </a:solidFill>
-                <a:effectLst/>
-                <a:latin typeface="Helvetica" panose="020B0604020202020204" pitchFamily="34" charset="0"/>
-                <a:cs typeface="Helvetica" panose="020B0604020202020204" pitchFamily="34" charset="0"/>
-              </a:rPr>
-              <a:t>nombre </a:t>
             </a:r>
             <a:r>
               <a:rPr lang="fr-FR" sz="2500" dirty="0">
@@ -3135,40 +3100,7 @@
                 <a:latin typeface="Helvetica" panose="020B0604020202020204" pitchFamily="34" charset="0"/>
                 <a:cs typeface="Helvetica" panose="020B0604020202020204" pitchFamily="34" charset="0"/>
               </a:rPr>
-              <a:t>de </a:t>
-            </a:r>
-            <a:r>
-              <a:rPr lang="fr-FR" sz="2500" dirty="0" smtClean="0">
-                <a:solidFill>
-                  <a:srgbClr val="000000"/>
-                </a:solidFill>
-                <a:effectLst/>
-                <a:latin typeface="Helvetica" panose="020B0604020202020204" pitchFamily="34" charset="0"/>
-                <a:cs typeface="Helvetica" panose="020B0604020202020204" pitchFamily="34" charset="0"/>
-              </a:rPr>
-              <a:t>ligatures, entre 300 et 1000 </a:t>
-            </a:r>
-            <a:r>
-              <a:rPr lang="fr-FR" sz="2500" dirty="0">
-                <a:solidFill>
-                  <a:srgbClr val="000000"/>
-                </a:solidFill>
-                <a:effectLst/>
-                <a:latin typeface="Helvetica" panose="020B0604020202020204" pitchFamily="34" charset="0"/>
-                <a:cs typeface="Helvetica" panose="020B0604020202020204" pitchFamily="34" charset="0"/>
-              </a:rPr>
-              <a:t>selon les </a:t>
-            </a:r>
-            <a:r>
-              <a:rPr lang="fr-FR" sz="2500" dirty="0" smtClean="0">
-                <a:solidFill>
-                  <a:srgbClr val="000000"/>
-                </a:solidFill>
-                <a:effectLst/>
-                <a:latin typeface="Helvetica" panose="020B0604020202020204" pitchFamily="34" charset="0"/>
-                <a:cs typeface="Helvetica" panose="020B0604020202020204" pitchFamily="34" charset="0"/>
-              </a:rPr>
-              <a:t>imprimés, qui doivent être incluses dans un modèle ou apprises par entraînement avant de pouvoir être reconnues correctement. </a:t>
+              <a:t>nombre de ligatures, entre 300 et 1000 selon les imprimés, qui doivent être incluses dans un modèle ou apprises par entraînement avant de pouvoir être reconnues correctement. </a:t>
             </a:r>
           </a:p>
         </p:txBody>
@@ -3240,21 +3172,21 @@
           <a:lstStyle/>
           <a:p>
             <a:r>
-              <a:rPr lang="nl-NL" sz="2400" dirty="0" smtClean="0">
+              <a:rPr lang="nl-NL" sz="2400" dirty="0">
                 <a:latin typeface="Helvetica" panose="020B0604020202020204" pitchFamily="34" charset="0"/>
                 <a:cs typeface="Helvetica" panose="020B0604020202020204" pitchFamily="34" charset="0"/>
               </a:rPr>
               <a:t>James </a:t>
             </a:r>
             <a:r>
-              <a:rPr lang="nl-NL" sz="2400" dirty="0" err="1" smtClean="0">
+              <a:rPr lang="nl-NL" sz="2400" dirty="0" err="1">
                 <a:latin typeface="Helvetica" panose="020B0604020202020204" pitchFamily="34" charset="0"/>
                 <a:cs typeface="Helvetica" panose="020B0604020202020204" pitchFamily="34" charset="0"/>
               </a:rPr>
               <a:t>Diderot</a:t>
             </a:r>
             <a:r>
-              <a:rPr lang="nl-NL" sz="2400" dirty="0" smtClean="0">
+              <a:rPr lang="nl-NL" sz="2400" dirty="0">
                 <a:latin typeface="Helvetica" panose="020B0604020202020204" pitchFamily="34" charset="0"/>
                 <a:cs typeface="Helvetica" panose="020B0604020202020204" pitchFamily="34" charset="0"/>
               </a:rPr>
@@ -3332,10 +3264,212 @@
                 <a:ea typeface="+mn-ea"/>
                 <a:cs typeface="Helvetica" panose="020B0604020202020204" pitchFamily="34" charset="0"/>
               </a:rPr>
-              <a:t>Le </a:t>
-            </a:r>
-            <a:r>
-              <a:rPr kumimoji="0" lang="fr-FR" sz="3800" b="0" i="0" u="none" strike="noStrike" kern="1200" cap="none" spc="0" normalizeH="0" baseline="0" noProof="0" dirty="0" smtClean="0">
+              <a:t>Le placement des diacritiques</a:t>
+            </a:r>
+            <a:endParaRPr kumimoji="0" lang="en-GB" sz="3800" b="0" i="0" u="none" strike="noStrike" kern="1200" cap="none" spc="0" normalizeH="0" baseline="0" noProof="0" dirty="0">
+              <a:ln>
+                <a:noFill/>
+              </a:ln>
+              <a:solidFill>
+                <a:prstClr val="black"/>
+              </a:solidFill>
+              <a:effectLst/>
+              <a:uLnTx/>
+              <a:uFillTx/>
+              <a:latin typeface="Helvetica" panose="020B0604020202020204" pitchFamily="34" charset="0"/>
+              <a:ea typeface="+mn-ea"/>
+              <a:cs typeface="Helvetica" panose="020B0604020202020204" pitchFamily="34" charset="0"/>
+            </a:endParaRPr>
+          </a:p>
+        </p:txBody>
+      </p:sp>
+      <p:pic>
+        <p:nvPicPr>
+          <p:cNvPr id="19" name="Picture 18">
+            <a:extLst>
+              <a:ext uri="{FF2B5EF4-FFF2-40B4-BE49-F238E27FC236}">
+                <a16:creationId xmlns:a16="http://schemas.microsoft.com/office/drawing/2014/main" id="{30346858-1292-6134-AE6B-7EC2EA0C1A10}"/>
+              </a:ext>
+            </a:extLst>
+          </p:cNvPr>
+          <p:cNvPicPr>
+            <a:picLocks noChangeAspect="1"/>
+          </p:cNvPicPr>
+          <p:nvPr>
+            <p:custDataLst>
+              <p:tags r:id="rId10"/>
+            </p:custDataLst>
+          </p:nvPr>
+        </p:nvPicPr>
+        <p:blipFill>
+          <a:blip r:embed="rId27"/>
+          <a:stretch>
+            <a:fillRect/>
+          </a:stretch>
+        </p:blipFill>
+        <p:spPr>
+          <a:xfrm>
+            <a:off x="2624732" y="11834793"/>
+            <a:ext cx="4407790" cy="1798476"/>
+          </a:xfrm>
+          <a:prstGeom prst="rect">
+            <a:avLst/>
+          </a:prstGeom>
+        </p:spPr>
+      </p:pic>
+      <p:pic>
+        <p:nvPicPr>
+          <p:cNvPr id="20" name="Picture 19">
+            <a:extLst>
+              <a:ext uri="{FF2B5EF4-FFF2-40B4-BE49-F238E27FC236}">
+                <a16:creationId xmlns:a16="http://schemas.microsoft.com/office/drawing/2014/main" id="{312ACE2A-F7BC-DC72-19E9-48789BFFFAC0}"/>
+              </a:ext>
+            </a:extLst>
+          </p:cNvPr>
+          <p:cNvPicPr>
+            <a:picLocks noChangeAspect="1"/>
+          </p:cNvPicPr>
+          <p:nvPr>
+            <p:custDataLst>
+              <p:tags r:id="rId11"/>
+            </p:custDataLst>
+          </p:nvPr>
+        </p:nvPicPr>
+        <p:blipFill>
+          <a:blip r:embed="rId28"/>
+          <a:stretch>
+            <a:fillRect/>
+          </a:stretch>
+        </p:blipFill>
+        <p:spPr>
+          <a:xfrm>
+            <a:off x="493347" y="11359476"/>
+            <a:ext cx="1255885" cy="755970"/>
+          </a:xfrm>
+          <a:prstGeom prst="rect">
+            <a:avLst/>
+          </a:prstGeom>
+        </p:spPr>
+      </p:pic>
+      <p:pic>
+        <p:nvPicPr>
+          <p:cNvPr id="21" name="Picture 20">
+            <a:extLst>
+              <a:ext uri="{FF2B5EF4-FFF2-40B4-BE49-F238E27FC236}">
+                <a16:creationId xmlns:a16="http://schemas.microsoft.com/office/drawing/2014/main" id="{8616C9F9-5D17-0AD6-7E3C-FE55C0BF53FE}"/>
+              </a:ext>
+            </a:extLst>
+          </p:cNvPr>
+          <p:cNvPicPr>
+            <a:picLocks noChangeAspect="1"/>
+          </p:cNvPicPr>
+          <p:nvPr>
+            <p:custDataLst>
+              <p:tags r:id="rId12"/>
+            </p:custDataLst>
+          </p:nvPr>
+        </p:nvPicPr>
+        <p:blipFill>
+          <a:blip r:embed="rId29"/>
+          <a:stretch>
+            <a:fillRect/>
+          </a:stretch>
+        </p:blipFill>
+        <p:spPr>
+          <a:xfrm>
+            <a:off x="1789508" y="11723272"/>
+            <a:ext cx="835224" cy="2213040"/>
+          </a:xfrm>
+          <a:prstGeom prst="rect">
+            <a:avLst/>
+          </a:prstGeom>
+        </p:spPr>
+      </p:pic>
+      <p:pic>
+        <p:nvPicPr>
+          <p:cNvPr id="22" name="Picture 21">
+            <a:extLst>
+              <a:ext uri="{FF2B5EF4-FFF2-40B4-BE49-F238E27FC236}">
+                <a16:creationId xmlns:a16="http://schemas.microsoft.com/office/drawing/2014/main" id="{D851BA12-5ECE-1B7A-4981-79D2D9712A07}"/>
+              </a:ext>
+            </a:extLst>
+          </p:cNvPr>
+          <p:cNvPicPr>
+            <a:picLocks noChangeAspect="1"/>
+          </p:cNvPicPr>
+          <p:nvPr>
+            <p:custDataLst>
+              <p:tags r:id="rId13"/>
+            </p:custDataLst>
+          </p:nvPr>
+        </p:nvPicPr>
+        <p:blipFill>
+          <a:blip r:embed="rId30"/>
+          <a:stretch>
+            <a:fillRect/>
+          </a:stretch>
+        </p:blipFill>
+        <p:spPr>
+          <a:xfrm>
+            <a:off x="493347" y="13525758"/>
+            <a:ext cx="1237595" cy="701101"/>
+          </a:xfrm>
+          <a:prstGeom prst="rect">
+            <a:avLst/>
+          </a:prstGeom>
+        </p:spPr>
+      </p:pic>
+      <p:sp>
+        <p:nvSpPr>
+          <p:cNvPr id="24" name="TextBox 23">
+            <a:extLst>
+              <a:ext uri="{FF2B5EF4-FFF2-40B4-BE49-F238E27FC236}">
+                <a16:creationId xmlns:a16="http://schemas.microsoft.com/office/drawing/2014/main" id="{9D261BE7-3F12-35C3-5CE5-222161C03446}"/>
+              </a:ext>
+            </a:extLst>
+          </p:cNvPr>
+          <p:cNvSpPr txBox="1"/>
+          <p:nvPr>
+            <p:custDataLst>
+              <p:tags r:id="rId14"/>
+            </p:custDataLst>
+          </p:nvPr>
+        </p:nvSpPr>
+        <p:spPr>
+          <a:xfrm>
+            <a:off x="7357546" y="11826202"/>
+            <a:ext cx="5498619" cy="2400657"/>
+          </a:xfrm>
+          <a:prstGeom prst="rect">
+            <a:avLst/>
+          </a:prstGeom>
+          <a:noFill/>
+        </p:spPr>
+        <p:txBody>
+          <a:bodyPr wrap="square">
+            <a:spAutoFit/>
+          </a:bodyPr>
+          <a:lstStyle/>
+          <a:p>
+            <a:pPr marL="0" marR="0" lvl="0" indent="0" algn="just" defTabSz="1752082" rtl="0" eaLnBrk="1" fontAlgn="auto" latinLnBrk="0" hangingPunct="1">
+              <a:lnSpc>
+                <a:spcPct val="150000"/>
+              </a:lnSpc>
+              <a:spcBef>
+                <a:spcPts val="0"/>
+              </a:spcBef>
+              <a:spcAft>
+                <a:spcPts val="0"/>
+              </a:spcAft>
+              <a:buClrTx/>
+              <a:buSzTx/>
+              <a:buFontTx/>
+              <a:buNone/>
+              <a:tabLst/>
+              <a:defRPr/>
+            </a:pPr>
+            <a:r>
+              <a:rPr kumimoji="0" lang="fr-FR" sz="2500" b="0" i="0" u="none" strike="noStrike" kern="1200" cap="none" spc="0" normalizeH="0" baseline="0" noProof="0" dirty="0">
                 <a:ln>
                   <a:noFill/>
                 </a:ln>
@@ -3349,8 +3483,308 @@
                 <a:ea typeface="+mn-ea"/>
                 <a:cs typeface="Helvetica" panose="020B0604020202020204" pitchFamily="34" charset="0"/>
               </a:rPr>
-              <a:t>placement </a:t>
-            </a:r>
+              <a:t>Le placement des diacritiques, varie entre les époques et les traditions d’imprimerie, ce qui demande à l’OCR à une standardisation.</a:t>
+            </a:r>
+            <a:endParaRPr kumimoji="0" lang="en-GB" sz="2500" b="0" i="0" u="none" strike="noStrike" kern="1200" cap="none" spc="0" normalizeH="0" baseline="0" noProof="0" dirty="0">
+              <a:ln>
+                <a:noFill/>
+              </a:ln>
+              <a:solidFill>
+                <a:prstClr val="black"/>
+              </a:solidFill>
+              <a:effectLst/>
+              <a:uLnTx/>
+              <a:uFillTx/>
+              <a:latin typeface="Helvetica" panose="020B0604020202020204" pitchFamily="34" charset="0"/>
+              <a:ea typeface="+mn-ea"/>
+              <a:cs typeface="Helvetica" panose="020B0604020202020204" pitchFamily="34" charset="0"/>
+            </a:endParaRPr>
+          </a:p>
+        </p:txBody>
+      </p:sp>
+      <p:pic>
+        <p:nvPicPr>
+          <p:cNvPr id="26" name="Picture 25">
+            <a:extLst>
+              <a:ext uri="{FF2B5EF4-FFF2-40B4-BE49-F238E27FC236}">
+                <a16:creationId xmlns:a16="http://schemas.microsoft.com/office/drawing/2014/main" id="{A653C8FE-5CF4-EE48-5285-C74A1F9236BE}"/>
+              </a:ext>
+            </a:extLst>
+          </p:cNvPr>
+          <p:cNvPicPr>
+            <a:picLocks noChangeAspect="1"/>
+          </p:cNvPicPr>
+          <p:nvPr>
+            <p:custDataLst>
+              <p:tags r:id="rId15"/>
+            </p:custDataLst>
+          </p:nvPr>
+        </p:nvPicPr>
+        <p:blipFill>
+          <a:blip r:embed="rId31"/>
+          <a:stretch>
+            <a:fillRect/>
+          </a:stretch>
+        </p:blipFill>
+        <p:spPr>
+          <a:xfrm>
+            <a:off x="9797750" y="2715342"/>
+            <a:ext cx="1103472" cy="317019"/>
+          </a:xfrm>
+          <a:prstGeom prst="rect">
+            <a:avLst/>
+          </a:prstGeom>
+        </p:spPr>
+      </p:pic>
+      <p:sp>
+        <p:nvSpPr>
+          <p:cNvPr id="29" name="TextBox 28">
+            <a:extLst>
+              <a:ext uri="{FF2B5EF4-FFF2-40B4-BE49-F238E27FC236}">
+                <a16:creationId xmlns:a16="http://schemas.microsoft.com/office/drawing/2014/main" id="{108D233A-AC58-4BC1-EFBC-B1F72306B8FF}"/>
+              </a:ext>
+            </a:extLst>
+          </p:cNvPr>
+          <p:cNvSpPr txBox="1"/>
+          <p:nvPr>
+            <p:custDataLst>
+              <p:tags r:id="rId16"/>
+            </p:custDataLst>
+          </p:nvPr>
+        </p:nvSpPr>
+        <p:spPr>
+          <a:xfrm>
+            <a:off x="182285" y="12062338"/>
+            <a:ext cx="1878008" cy="461665"/>
+          </a:xfrm>
+          <a:prstGeom prst="rect">
+            <a:avLst/>
+          </a:prstGeom>
+          <a:noFill/>
+        </p:spPr>
+        <p:txBody>
+          <a:bodyPr wrap="square">
+            <a:spAutoFit/>
+          </a:bodyPr>
+          <a:lstStyle/>
+          <a:p>
+            <a:pPr marL="0" marR="0" lvl="0" indent="0" algn="l" defTabSz="1752082" rtl="0" eaLnBrk="1" fontAlgn="auto" latinLnBrk="0" hangingPunct="1">
+              <a:lnSpc>
+                <a:spcPct val="100000"/>
+              </a:lnSpc>
+              <a:spcBef>
+                <a:spcPts val="0"/>
+              </a:spcBef>
+              <a:spcAft>
+                <a:spcPts val="0"/>
+              </a:spcAft>
+              <a:buClrTx/>
+              <a:buSzTx/>
+              <a:buFontTx/>
+              <a:buNone/>
+              <a:tabLst/>
+              <a:defRPr/>
+            </a:pPr>
+            <a:r>
+              <a:rPr kumimoji="0" lang="fr-FR" sz="2400" b="0" i="0" u="none" strike="noStrike" kern="1200" cap="none" spc="0" normalizeH="0" baseline="0" noProof="0" dirty="0">
+                <a:ln>
+                  <a:noFill/>
+                </a:ln>
+                <a:solidFill>
+                  <a:prstClr val="black"/>
+                </a:solidFill>
+                <a:effectLst/>
+                <a:uLnTx/>
+                <a:uFillTx/>
+                <a:latin typeface="Helvetica" panose="020B0604020202020204" pitchFamily="34" charset="0"/>
+                <a:ea typeface="+mn-ea"/>
+                <a:cs typeface="Helvetica" panose="020B0604020202020204" pitchFamily="34" charset="0"/>
+              </a:rPr>
+              <a:t>J.D., v.5,</a:t>
+            </a:r>
+            <a:r>
+              <a:rPr kumimoji="0" lang="fr-FR" sz="2400" b="0" i="0" u="none" strike="noStrike" kern="1200" cap="none" spc="0" normalizeH="0" noProof="0" dirty="0">
+                <a:ln>
+                  <a:noFill/>
+                </a:ln>
+                <a:solidFill>
+                  <a:prstClr val="black"/>
+                </a:solidFill>
+                <a:effectLst/>
+                <a:uLnTx/>
+                <a:uFillTx/>
+                <a:latin typeface="Helvetica" panose="020B0604020202020204" pitchFamily="34" charset="0"/>
+                <a:ea typeface="+mn-ea"/>
+                <a:cs typeface="Helvetica" panose="020B0604020202020204" pitchFamily="34" charset="0"/>
+              </a:rPr>
+              <a:t> </a:t>
+            </a:r>
+            <a:r>
+              <a:rPr kumimoji="0" lang="fr-FR" sz="2400" b="0" i="0" u="none" strike="noStrike" kern="1200" cap="none" spc="0" normalizeH="0" baseline="0" noProof="0" dirty="0">
+                <a:ln>
+                  <a:noFill/>
+                </a:ln>
+                <a:solidFill>
+                  <a:prstClr val="black"/>
+                </a:solidFill>
+                <a:effectLst/>
+                <a:uLnTx/>
+                <a:uFillTx/>
+                <a:latin typeface="Helvetica" panose="020B0604020202020204" pitchFamily="34" charset="0"/>
+                <a:ea typeface="+mn-ea"/>
+                <a:cs typeface="Helvetica" panose="020B0604020202020204" pitchFamily="34" charset="0"/>
+              </a:rPr>
+              <a:t>59. </a:t>
+            </a:r>
+            <a:endParaRPr kumimoji="0" lang="en-GB" sz="2400" b="0" i="0" u="none" strike="noStrike" kern="1200" cap="none" spc="0" normalizeH="0" baseline="0" noProof="0" dirty="0">
+              <a:ln>
+                <a:noFill/>
+              </a:ln>
+              <a:solidFill>
+                <a:prstClr val="black"/>
+              </a:solidFill>
+              <a:effectLst/>
+              <a:uLnTx/>
+              <a:uFillTx/>
+              <a:latin typeface="Helvetica" panose="020B0604020202020204" pitchFamily="34" charset="0"/>
+              <a:ea typeface="+mn-ea"/>
+              <a:cs typeface="Helvetica" panose="020B0604020202020204" pitchFamily="34" charset="0"/>
+            </a:endParaRPr>
+          </a:p>
+        </p:txBody>
+      </p:sp>
+      <p:sp>
+        <p:nvSpPr>
+          <p:cNvPr id="31" name="TextBox 30">
+            <a:extLst>
+              <a:ext uri="{FF2B5EF4-FFF2-40B4-BE49-F238E27FC236}">
+                <a16:creationId xmlns:a16="http://schemas.microsoft.com/office/drawing/2014/main" id="{E6CA43B4-251E-5AD2-56BF-3D2EE4702649}"/>
+              </a:ext>
+            </a:extLst>
+          </p:cNvPr>
+          <p:cNvSpPr txBox="1"/>
+          <p:nvPr>
+            <p:custDataLst>
+              <p:tags r:id="rId17"/>
+            </p:custDataLst>
+          </p:nvPr>
+        </p:nvSpPr>
+        <p:spPr>
+          <a:xfrm>
+            <a:off x="493347" y="14245073"/>
+            <a:ext cx="2131385" cy="461665"/>
+          </a:xfrm>
+          <a:prstGeom prst="rect">
+            <a:avLst/>
+          </a:prstGeom>
+          <a:noFill/>
+        </p:spPr>
+        <p:txBody>
+          <a:bodyPr wrap="square">
+            <a:spAutoFit/>
+          </a:bodyPr>
+          <a:lstStyle/>
+          <a:p>
+            <a:pPr marL="0" marR="0" lvl="0" indent="0" algn="l" defTabSz="1752082" rtl="0" eaLnBrk="1" fontAlgn="auto" latinLnBrk="0" hangingPunct="1">
+              <a:lnSpc>
+                <a:spcPct val="100000"/>
+              </a:lnSpc>
+              <a:spcBef>
+                <a:spcPts val="0"/>
+              </a:spcBef>
+              <a:spcAft>
+                <a:spcPts val="0"/>
+              </a:spcAft>
+              <a:buClrTx/>
+              <a:buSzTx/>
+              <a:buFontTx/>
+              <a:buNone/>
+              <a:tabLst/>
+              <a:defRPr/>
+            </a:pPr>
+            <a:r>
+              <a:rPr kumimoji="0" lang="fr-FR" sz="2400" b="0" i="0" u="none" strike="noStrike" kern="1200" cap="none" spc="0" normalizeH="0" baseline="0" noProof="0" dirty="0">
+                <a:ln>
+                  <a:noFill/>
+                </a:ln>
+                <a:solidFill>
+                  <a:prstClr val="black"/>
+                </a:solidFill>
+                <a:effectLst/>
+                <a:uLnTx/>
+                <a:uFillTx/>
+                <a:latin typeface="Helvetica" panose="020B0604020202020204" pitchFamily="34" charset="0"/>
+                <a:ea typeface="+mn-ea"/>
+                <a:cs typeface="Helvetica" panose="020B0604020202020204" pitchFamily="34" charset="0"/>
+              </a:rPr>
+              <a:t>C., 538.</a:t>
+            </a:r>
+            <a:endParaRPr kumimoji="0" lang="en-GB" sz="2400" b="0" i="0" u="none" strike="noStrike" kern="1200" cap="none" spc="0" normalizeH="0" baseline="0" noProof="0" dirty="0">
+              <a:ln>
+                <a:noFill/>
+              </a:ln>
+              <a:solidFill>
+                <a:prstClr val="black"/>
+              </a:solidFill>
+              <a:effectLst/>
+              <a:uLnTx/>
+              <a:uFillTx/>
+              <a:latin typeface="Helvetica" panose="020B0604020202020204" pitchFamily="34" charset="0"/>
+              <a:ea typeface="+mn-ea"/>
+              <a:cs typeface="Helvetica" panose="020B0604020202020204" pitchFamily="34" charset="0"/>
+            </a:endParaRPr>
+          </a:p>
+        </p:txBody>
+      </p:sp>
+      <p:sp>
+        <p:nvSpPr>
+          <p:cNvPr id="23" name="TextBox 17">
+            <a:extLst>
+              <a:ext uri="{FF2B5EF4-FFF2-40B4-BE49-F238E27FC236}">
+                <a16:creationId xmlns:a16="http://schemas.microsoft.com/office/drawing/2014/main" id="{791B4933-12A6-C9C6-71AF-5F5A1C465440}"/>
+              </a:ext>
+            </a:extLst>
+          </p:cNvPr>
+          <p:cNvSpPr txBox="1"/>
+          <p:nvPr>
+            <p:custDataLst>
+              <p:tags r:id="rId18"/>
+            </p:custDataLst>
+          </p:nvPr>
+        </p:nvSpPr>
+        <p:spPr>
+          <a:xfrm>
+            <a:off x="8096231" y="3599723"/>
+            <a:ext cx="6237662" cy="677108"/>
+          </a:xfrm>
+          <a:prstGeom prst="rect">
+            <a:avLst/>
+          </a:prstGeom>
+          <a:noFill/>
+        </p:spPr>
+        <p:txBody>
+          <a:bodyPr wrap="square">
+            <a:spAutoFit/>
+          </a:bodyPr>
+          <a:lstStyle/>
+          <a:p>
+            <a:pPr marL="0" marR="0" lvl="0" indent="0" algn="l" defTabSz="1752082" rtl="0" eaLnBrk="1" fontAlgn="auto" latinLnBrk="0" hangingPunct="1">
+              <a:lnSpc>
+                <a:spcPct val="100000"/>
+              </a:lnSpc>
+              <a:spcBef>
+                <a:spcPts val="0"/>
+              </a:spcBef>
+              <a:spcAft>
+                <a:spcPts val="0"/>
+              </a:spcAft>
+              <a:buClrTx/>
+              <a:buSzTx/>
+              <a:buFontTx/>
+              <a:buNone/>
+              <a:tabLst/>
+              <a:defRPr/>
+            </a:pPr>
             <a:r>
               <a:rPr kumimoji="0" lang="fr-FR" sz="3800" b="0" i="0" u="none" strike="noStrike" kern="1200" cap="none" spc="0" normalizeH="0" baseline="0" noProof="0" dirty="0">
                 <a:ln>
@@ -3366,7 +3800,7 @@
                 <a:ea typeface="+mn-ea"/>
                 <a:cs typeface="Helvetica" panose="020B0604020202020204" pitchFamily="34" charset="0"/>
               </a:rPr>
-              <a:t>des diacritiques</a:t>
+              <a:t>Des ligatures protéiformes</a:t>
             </a:r>
             <a:endParaRPr kumimoji="0" lang="en-GB" sz="3800" b="0" i="0" u="none" strike="noStrike" kern="1200" cap="none" spc="0" normalizeH="0" baseline="0" noProof="0" dirty="0">
               <a:ln>
@@ -3387,610 +3821,6 @@
       </p:sp>
       <p:pic>
         <p:nvPicPr>
-          <p:cNvPr id="19" name="Picture 18">
-            <a:extLst>
-              <a:ext uri="{FF2B5EF4-FFF2-40B4-BE49-F238E27FC236}">
-                <a16:creationId xmlns:a16="http://schemas.microsoft.com/office/drawing/2014/main" id="{30346858-1292-6134-AE6B-7EC2EA0C1A10}"/>
-              </a:ext>
-            </a:extLst>
-          </p:cNvPr>
-          <p:cNvPicPr>
-            <a:picLocks noChangeAspect="1"/>
-          </p:cNvPicPr>
-          <p:nvPr>
-            <p:custDataLst>
-              <p:tags r:id="rId10"/>
-            </p:custDataLst>
-          </p:nvPr>
-        </p:nvPicPr>
-        <p:blipFill>
-          <a:blip r:embed="rId27"/>
-          <a:stretch>
-            <a:fillRect/>
-          </a:stretch>
-        </p:blipFill>
-        <p:spPr>
-          <a:xfrm>
-            <a:off x="2624732" y="11834793"/>
-            <a:ext cx="4407790" cy="1798476"/>
-          </a:xfrm>
-          <a:prstGeom prst="rect">
-            <a:avLst/>
-          </a:prstGeom>
-        </p:spPr>
-      </p:pic>
-      <p:pic>
-        <p:nvPicPr>
-          <p:cNvPr id="20" name="Picture 19">
-            <a:extLst>
-              <a:ext uri="{FF2B5EF4-FFF2-40B4-BE49-F238E27FC236}">
-                <a16:creationId xmlns:a16="http://schemas.microsoft.com/office/drawing/2014/main" id="{312ACE2A-F7BC-DC72-19E9-48789BFFFAC0}"/>
-              </a:ext>
-            </a:extLst>
-          </p:cNvPr>
-          <p:cNvPicPr>
-            <a:picLocks noChangeAspect="1"/>
-          </p:cNvPicPr>
-          <p:nvPr>
-            <p:custDataLst>
-              <p:tags r:id="rId11"/>
-            </p:custDataLst>
-          </p:nvPr>
-        </p:nvPicPr>
-        <p:blipFill>
-          <a:blip r:embed="rId28"/>
-          <a:stretch>
-            <a:fillRect/>
-          </a:stretch>
-        </p:blipFill>
-        <p:spPr>
-          <a:xfrm>
-            <a:off x="493347" y="11359476"/>
-            <a:ext cx="1255885" cy="755970"/>
-          </a:xfrm>
-          <a:prstGeom prst="rect">
-            <a:avLst/>
-          </a:prstGeom>
-        </p:spPr>
-      </p:pic>
-      <p:pic>
-        <p:nvPicPr>
-          <p:cNvPr id="21" name="Picture 20">
-            <a:extLst>
-              <a:ext uri="{FF2B5EF4-FFF2-40B4-BE49-F238E27FC236}">
-                <a16:creationId xmlns:a16="http://schemas.microsoft.com/office/drawing/2014/main" id="{8616C9F9-5D17-0AD6-7E3C-FE55C0BF53FE}"/>
-              </a:ext>
-            </a:extLst>
-          </p:cNvPr>
-          <p:cNvPicPr>
-            <a:picLocks noChangeAspect="1"/>
-          </p:cNvPicPr>
-          <p:nvPr>
-            <p:custDataLst>
-              <p:tags r:id="rId12"/>
-            </p:custDataLst>
-          </p:nvPr>
-        </p:nvPicPr>
-        <p:blipFill>
-          <a:blip r:embed="rId29"/>
-          <a:stretch>
-            <a:fillRect/>
-          </a:stretch>
-        </p:blipFill>
-        <p:spPr>
-          <a:xfrm>
-            <a:off x="1789508" y="11723272"/>
-            <a:ext cx="835224" cy="2213040"/>
-          </a:xfrm>
-          <a:prstGeom prst="rect">
-            <a:avLst/>
-          </a:prstGeom>
-        </p:spPr>
-      </p:pic>
-      <p:pic>
-        <p:nvPicPr>
-          <p:cNvPr id="22" name="Picture 21">
-            <a:extLst>
-              <a:ext uri="{FF2B5EF4-FFF2-40B4-BE49-F238E27FC236}">
-                <a16:creationId xmlns:a16="http://schemas.microsoft.com/office/drawing/2014/main" id="{D851BA12-5ECE-1B7A-4981-79D2D9712A07}"/>
-              </a:ext>
-            </a:extLst>
-          </p:cNvPr>
-          <p:cNvPicPr>
-            <a:picLocks noChangeAspect="1"/>
-          </p:cNvPicPr>
-          <p:nvPr>
-            <p:custDataLst>
-              <p:tags r:id="rId13"/>
-            </p:custDataLst>
-          </p:nvPr>
-        </p:nvPicPr>
-        <p:blipFill>
-          <a:blip r:embed="rId30"/>
-          <a:stretch>
-            <a:fillRect/>
-          </a:stretch>
-        </p:blipFill>
-        <p:spPr>
-          <a:xfrm>
-            <a:off x="493347" y="13525758"/>
-            <a:ext cx="1237595" cy="701101"/>
-          </a:xfrm>
-          <a:prstGeom prst="rect">
-            <a:avLst/>
-          </a:prstGeom>
-        </p:spPr>
-      </p:pic>
-      <p:sp>
-        <p:nvSpPr>
-          <p:cNvPr id="24" name="TextBox 23">
-            <a:extLst>
-              <a:ext uri="{FF2B5EF4-FFF2-40B4-BE49-F238E27FC236}">
-                <a16:creationId xmlns:a16="http://schemas.microsoft.com/office/drawing/2014/main" id="{9D261BE7-3F12-35C3-5CE5-222161C03446}"/>
-              </a:ext>
-            </a:extLst>
-          </p:cNvPr>
-          <p:cNvSpPr txBox="1"/>
-          <p:nvPr>
-            <p:custDataLst>
-              <p:tags r:id="rId14"/>
-            </p:custDataLst>
-          </p:nvPr>
-        </p:nvSpPr>
-        <p:spPr>
-          <a:xfrm>
-            <a:off x="7357546" y="11826202"/>
-            <a:ext cx="5498619" cy="2400657"/>
-          </a:xfrm>
-          <a:prstGeom prst="rect">
-            <a:avLst/>
-          </a:prstGeom>
-          <a:noFill/>
-        </p:spPr>
-        <p:txBody>
-          <a:bodyPr wrap="square">
-            <a:spAutoFit/>
-          </a:bodyPr>
-          <a:lstStyle/>
-          <a:p>
-            <a:pPr marL="0" marR="0" lvl="0" indent="0" algn="just" defTabSz="1752082" rtl="0" eaLnBrk="1" fontAlgn="auto" latinLnBrk="0" hangingPunct="1">
-              <a:lnSpc>
-                <a:spcPct val="150000"/>
-              </a:lnSpc>
-              <a:spcBef>
-                <a:spcPts val="0"/>
-              </a:spcBef>
-              <a:spcAft>
-                <a:spcPts val="0"/>
-              </a:spcAft>
-              <a:buClrTx/>
-              <a:buSzTx/>
-              <a:buFontTx/>
-              <a:buNone/>
-              <a:tabLst/>
-              <a:defRPr/>
-            </a:pPr>
-            <a:r>
-              <a:rPr kumimoji="0" lang="fr-FR" sz="2500" b="0" i="0" u="none" strike="noStrike" kern="1200" cap="none" spc="0" normalizeH="0" baseline="0" noProof="0" dirty="0">
-                <a:ln>
-                  <a:noFill/>
-                </a:ln>
-                <a:solidFill>
-                  <a:prstClr val="black"/>
-                </a:solidFill>
-                <a:effectLst/>
-                <a:uLnTx/>
-                <a:uFillTx/>
-                <a:latin typeface="Helvetica" panose="020B0604020202020204" pitchFamily="34" charset="0"/>
-                <a:ea typeface="+mn-ea"/>
-                <a:cs typeface="Helvetica" panose="020B0604020202020204" pitchFamily="34" charset="0"/>
-              </a:rPr>
-              <a:t>Le placement des diacritiques, varie entre les époques et les traditions d’imprimerie, ce qui demande à </a:t>
-            </a:r>
-            <a:r>
-              <a:rPr kumimoji="0" lang="fr-FR" sz="2500" b="0" i="0" u="none" strike="noStrike" kern="1200" cap="none" spc="0" normalizeH="0" baseline="0" noProof="0" dirty="0" smtClean="0">
-                <a:ln>
-                  <a:noFill/>
-                </a:ln>
-                <a:solidFill>
-                  <a:prstClr val="black"/>
-                </a:solidFill>
-                <a:effectLst/>
-                <a:uLnTx/>
-                <a:uFillTx/>
-                <a:latin typeface="Helvetica" panose="020B0604020202020204" pitchFamily="34" charset="0"/>
-                <a:ea typeface="+mn-ea"/>
-                <a:cs typeface="Helvetica" panose="020B0604020202020204" pitchFamily="34" charset="0"/>
-              </a:rPr>
-              <a:t>l’OCR </a:t>
-            </a:r>
-            <a:r>
-              <a:rPr kumimoji="0" lang="fr-FR" sz="2500" b="0" i="0" u="none" strike="noStrike" kern="1200" cap="none" spc="0" normalizeH="0" baseline="0" noProof="0" dirty="0">
-                <a:ln>
-                  <a:noFill/>
-                </a:ln>
-                <a:solidFill>
-                  <a:prstClr val="black"/>
-                </a:solidFill>
-                <a:effectLst/>
-                <a:uLnTx/>
-                <a:uFillTx/>
-                <a:latin typeface="Helvetica" panose="020B0604020202020204" pitchFamily="34" charset="0"/>
-                <a:ea typeface="+mn-ea"/>
-                <a:cs typeface="Helvetica" panose="020B0604020202020204" pitchFamily="34" charset="0"/>
-              </a:rPr>
-              <a:t>à une standardisation.</a:t>
-            </a:r>
-            <a:endParaRPr kumimoji="0" lang="en-GB" sz="2500" b="0" i="0" u="none" strike="noStrike" kern="1200" cap="none" spc="0" normalizeH="0" baseline="0" noProof="0" dirty="0">
-              <a:ln>
-                <a:noFill/>
-              </a:ln>
-              <a:solidFill>
-                <a:prstClr val="black"/>
-              </a:solidFill>
-              <a:effectLst/>
-              <a:uLnTx/>
-              <a:uFillTx/>
-              <a:latin typeface="Helvetica" panose="020B0604020202020204" pitchFamily="34" charset="0"/>
-              <a:ea typeface="+mn-ea"/>
-              <a:cs typeface="Helvetica" panose="020B0604020202020204" pitchFamily="34" charset="0"/>
-            </a:endParaRPr>
-          </a:p>
-        </p:txBody>
-      </p:sp>
-      <p:pic>
-        <p:nvPicPr>
-          <p:cNvPr id="26" name="Picture 25">
-            <a:extLst>
-              <a:ext uri="{FF2B5EF4-FFF2-40B4-BE49-F238E27FC236}">
-                <a16:creationId xmlns:a16="http://schemas.microsoft.com/office/drawing/2014/main" id="{A653C8FE-5CF4-EE48-5285-C74A1F9236BE}"/>
-              </a:ext>
-            </a:extLst>
-          </p:cNvPr>
-          <p:cNvPicPr>
-            <a:picLocks noChangeAspect="1"/>
-          </p:cNvPicPr>
-          <p:nvPr>
-            <p:custDataLst>
-              <p:tags r:id="rId15"/>
-            </p:custDataLst>
-          </p:nvPr>
-        </p:nvPicPr>
-        <p:blipFill>
-          <a:blip r:embed="rId31"/>
-          <a:stretch>
-            <a:fillRect/>
-          </a:stretch>
-        </p:blipFill>
-        <p:spPr>
-          <a:xfrm>
-            <a:off x="9797750" y="2715342"/>
-            <a:ext cx="1103472" cy="317019"/>
-          </a:xfrm>
-          <a:prstGeom prst="rect">
-            <a:avLst/>
-          </a:prstGeom>
-        </p:spPr>
-      </p:pic>
-      <p:sp>
-        <p:nvSpPr>
-          <p:cNvPr id="29" name="TextBox 28">
-            <a:extLst>
-              <a:ext uri="{FF2B5EF4-FFF2-40B4-BE49-F238E27FC236}">
-                <a16:creationId xmlns:a16="http://schemas.microsoft.com/office/drawing/2014/main" id="{108D233A-AC58-4BC1-EFBC-B1F72306B8FF}"/>
-              </a:ext>
-            </a:extLst>
-          </p:cNvPr>
-          <p:cNvSpPr txBox="1"/>
-          <p:nvPr>
-            <p:custDataLst>
-              <p:tags r:id="rId16"/>
-            </p:custDataLst>
-          </p:nvPr>
-        </p:nvSpPr>
-        <p:spPr>
-          <a:xfrm>
-            <a:off x="182285" y="12062338"/>
-            <a:ext cx="1878008" cy="461665"/>
-          </a:xfrm>
-          <a:prstGeom prst="rect">
-            <a:avLst/>
-          </a:prstGeom>
-          <a:noFill/>
-        </p:spPr>
-        <p:txBody>
-          <a:bodyPr wrap="square">
-            <a:spAutoFit/>
-          </a:bodyPr>
-          <a:lstStyle/>
-          <a:p>
-            <a:pPr marL="0" marR="0" lvl="0" indent="0" algn="l" defTabSz="1752082" rtl="0" eaLnBrk="1" fontAlgn="auto" latinLnBrk="0" hangingPunct="1">
-              <a:lnSpc>
-                <a:spcPct val="100000"/>
-              </a:lnSpc>
-              <a:spcBef>
-                <a:spcPts val="0"/>
-              </a:spcBef>
-              <a:spcAft>
-                <a:spcPts val="0"/>
-              </a:spcAft>
-              <a:buClrTx/>
-              <a:buSzTx/>
-              <a:buFontTx/>
-              <a:buNone/>
-              <a:tabLst/>
-              <a:defRPr/>
-            </a:pPr>
-            <a:r>
-              <a:rPr kumimoji="0" lang="fr-FR" sz="2400" b="0" i="0" u="none" strike="noStrike" kern="1200" cap="none" spc="0" normalizeH="0" baseline="0" noProof="0" dirty="0" smtClean="0">
-                <a:ln>
-                  <a:noFill/>
-                </a:ln>
-                <a:solidFill>
-                  <a:prstClr val="black"/>
-                </a:solidFill>
-                <a:effectLst/>
-                <a:uLnTx/>
-                <a:uFillTx/>
-                <a:latin typeface="Helvetica" panose="020B0604020202020204" pitchFamily="34" charset="0"/>
-                <a:ea typeface="+mn-ea"/>
-                <a:cs typeface="Helvetica" panose="020B0604020202020204" pitchFamily="34" charset="0"/>
-              </a:rPr>
-              <a:t>J.D., v.5,</a:t>
-            </a:r>
-            <a:r>
-              <a:rPr kumimoji="0" lang="fr-FR" sz="2400" b="0" i="0" u="none" strike="noStrike" kern="1200" cap="none" spc="0" normalizeH="0" noProof="0" dirty="0" smtClean="0">
-                <a:ln>
-                  <a:noFill/>
-                </a:ln>
-                <a:solidFill>
-                  <a:prstClr val="black"/>
-                </a:solidFill>
-                <a:effectLst/>
-                <a:uLnTx/>
-                <a:uFillTx/>
-                <a:latin typeface="Helvetica" panose="020B0604020202020204" pitchFamily="34" charset="0"/>
-                <a:ea typeface="+mn-ea"/>
-                <a:cs typeface="Helvetica" panose="020B0604020202020204" pitchFamily="34" charset="0"/>
-              </a:rPr>
-              <a:t> </a:t>
-            </a:r>
-            <a:r>
-              <a:rPr kumimoji="0" lang="fr-FR" sz="2400" b="0" i="0" u="none" strike="noStrike" kern="1200" cap="none" spc="0" normalizeH="0" baseline="0" noProof="0" dirty="0" smtClean="0">
-                <a:ln>
-                  <a:noFill/>
-                </a:ln>
-                <a:solidFill>
-                  <a:prstClr val="black"/>
-                </a:solidFill>
-                <a:effectLst/>
-                <a:uLnTx/>
-                <a:uFillTx/>
-                <a:latin typeface="Helvetica" panose="020B0604020202020204" pitchFamily="34" charset="0"/>
-                <a:ea typeface="+mn-ea"/>
-                <a:cs typeface="Helvetica" panose="020B0604020202020204" pitchFamily="34" charset="0"/>
-              </a:rPr>
-              <a:t>59</a:t>
-            </a:r>
-            <a:r>
-              <a:rPr kumimoji="0" lang="fr-FR" sz="2400" b="0" i="0" u="none" strike="noStrike" kern="1200" cap="none" spc="0" normalizeH="0" baseline="0" noProof="0" dirty="0">
-                <a:ln>
-                  <a:noFill/>
-                </a:ln>
-                <a:solidFill>
-                  <a:prstClr val="black"/>
-                </a:solidFill>
-                <a:effectLst/>
-                <a:uLnTx/>
-                <a:uFillTx/>
-                <a:latin typeface="Helvetica" panose="020B0604020202020204" pitchFamily="34" charset="0"/>
-                <a:ea typeface="+mn-ea"/>
-                <a:cs typeface="Helvetica" panose="020B0604020202020204" pitchFamily="34" charset="0"/>
-              </a:rPr>
-              <a:t>. </a:t>
-            </a:r>
-            <a:endParaRPr kumimoji="0" lang="en-GB" sz="2400" b="0" i="0" u="none" strike="noStrike" kern="1200" cap="none" spc="0" normalizeH="0" baseline="0" noProof="0" dirty="0">
-              <a:ln>
-                <a:noFill/>
-              </a:ln>
-              <a:solidFill>
-                <a:prstClr val="black"/>
-              </a:solidFill>
-              <a:effectLst/>
-              <a:uLnTx/>
-              <a:uFillTx/>
-              <a:latin typeface="Helvetica" panose="020B0604020202020204" pitchFamily="34" charset="0"/>
-              <a:ea typeface="+mn-ea"/>
-              <a:cs typeface="Helvetica" panose="020B0604020202020204" pitchFamily="34" charset="0"/>
-            </a:endParaRPr>
-          </a:p>
-        </p:txBody>
-      </p:sp>
-      <p:sp>
-        <p:nvSpPr>
-          <p:cNvPr id="31" name="TextBox 30">
-            <a:extLst>
-              <a:ext uri="{FF2B5EF4-FFF2-40B4-BE49-F238E27FC236}">
-                <a16:creationId xmlns:a16="http://schemas.microsoft.com/office/drawing/2014/main" id="{E6CA43B4-251E-5AD2-56BF-3D2EE4702649}"/>
-              </a:ext>
-            </a:extLst>
-          </p:cNvPr>
-          <p:cNvSpPr txBox="1"/>
-          <p:nvPr>
-            <p:custDataLst>
-              <p:tags r:id="rId17"/>
-            </p:custDataLst>
-          </p:nvPr>
-        </p:nvSpPr>
-        <p:spPr>
-          <a:xfrm>
-            <a:off x="493347" y="14245073"/>
-            <a:ext cx="2131385" cy="461665"/>
-          </a:xfrm>
-          <a:prstGeom prst="rect">
-            <a:avLst/>
-          </a:prstGeom>
-          <a:noFill/>
-        </p:spPr>
-        <p:txBody>
-          <a:bodyPr wrap="square">
-            <a:spAutoFit/>
-          </a:bodyPr>
-          <a:lstStyle/>
-          <a:p>
-            <a:pPr marL="0" marR="0" lvl="0" indent="0" algn="l" defTabSz="1752082" rtl="0" eaLnBrk="1" fontAlgn="auto" latinLnBrk="0" hangingPunct="1">
-              <a:lnSpc>
-                <a:spcPct val="100000"/>
-              </a:lnSpc>
-              <a:spcBef>
-                <a:spcPts val="0"/>
-              </a:spcBef>
-              <a:spcAft>
-                <a:spcPts val="0"/>
-              </a:spcAft>
-              <a:buClrTx/>
-              <a:buSzTx/>
-              <a:buFontTx/>
-              <a:buNone/>
-              <a:tabLst/>
-              <a:defRPr/>
-            </a:pPr>
-            <a:r>
-              <a:rPr kumimoji="0" lang="fr-FR" sz="2400" b="0" i="0" u="none" strike="noStrike" kern="1200" cap="none" spc="0" normalizeH="0" baseline="0" noProof="0" dirty="0" smtClean="0">
-                <a:ln>
-                  <a:noFill/>
-                </a:ln>
-                <a:solidFill>
-                  <a:prstClr val="black"/>
-                </a:solidFill>
-                <a:effectLst/>
-                <a:uLnTx/>
-                <a:uFillTx/>
-                <a:latin typeface="Helvetica" panose="020B0604020202020204" pitchFamily="34" charset="0"/>
-                <a:ea typeface="+mn-ea"/>
-                <a:cs typeface="Helvetica" panose="020B0604020202020204" pitchFamily="34" charset="0"/>
-              </a:rPr>
-              <a:t>C., 538</a:t>
-            </a:r>
-            <a:r>
-              <a:rPr kumimoji="0" lang="fr-FR" sz="2400" b="0" i="0" u="none" strike="noStrike" kern="1200" cap="none" spc="0" normalizeH="0" baseline="0" noProof="0" dirty="0">
-                <a:ln>
-                  <a:noFill/>
-                </a:ln>
-                <a:solidFill>
-                  <a:prstClr val="black"/>
-                </a:solidFill>
-                <a:effectLst/>
-                <a:uLnTx/>
-                <a:uFillTx/>
-                <a:latin typeface="Helvetica" panose="020B0604020202020204" pitchFamily="34" charset="0"/>
-                <a:ea typeface="+mn-ea"/>
-                <a:cs typeface="Helvetica" panose="020B0604020202020204" pitchFamily="34" charset="0"/>
-              </a:rPr>
-              <a:t>.</a:t>
-            </a:r>
-            <a:endParaRPr kumimoji="0" lang="en-GB" sz="2400" b="0" i="0" u="none" strike="noStrike" kern="1200" cap="none" spc="0" normalizeH="0" baseline="0" noProof="0" dirty="0">
-              <a:ln>
-                <a:noFill/>
-              </a:ln>
-              <a:solidFill>
-                <a:prstClr val="black"/>
-              </a:solidFill>
-              <a:effectLst/>
-              <a:uLnTx/>
-              <a:uFillTx/>
-              <a:latin typeface="Helvetica" panose="020B0604020202020204" pitchFamily="34" charset="0"/>
-              <a:ea typeface="+mn-ea"/>
-              <a:cs typeface="Helvetica" panose="020B0604020202020204" pitchFamily="34" charset="0"/>
-            </a:endParaRPr>
-          </a:p>
-        </p:txBody>
-      </p:sp>
-      <p:sp>
-        <p:nvSpPr>
-          <p:cNvPr id="23" name="TextBox 17">
-            <a:extLst>
-              <a:ext uri="{FF2B5EF4-FFF2-40B4-BE49-F238E27FC236}">
-                <a16:creationId xmlns:a16="http://schemas.microsoft.com/office/drawing/2014/main" id="{791B4933-12A6-C9C6-71AF-5F5A1C465440}"/>
-              </a:ext>
-            </a:extLst>
-          </p:cNvPr>
-          <p:cNvSpPr txBox="1"/>
-          <p:nvPr>
-            <p:custDataLst>
-              <p:tags r:id="rId18"/>
-            </p:custDataLst>
-          </p:nvPr>
-        </p:nvSpPr>
-        <p:spPr>
-          <a:xfrm>
-            <a:off x="8096231" y="3599723"/>
-            <a:ext cx="6237662" cy="677108"/>
-          </a:xfrm>
-          <a:prstGeom prst="rect">
-            <a:avLst/>
-          </a:prstGeom>
-          <a:noFill/>
-        </p:spPr>
-        <p:txBody>
-          <a:bodyPr wrap="square">
-            <a:spAutoFit/>
-          </a:bodyPr>
-          <a:lstStyle/>
-          <a:p>
-            <a:pPr marL="0" marR="0" lvl="0" indent="0" algn="l" defTabSz="1752082" rtl="0" eaLnBrk="1" fontAlgn="auto" latinLnBrk="0" hangingPunct="1">
-              <a:lnSpc>
-                <a:spcPct val="100000"/>
-              </a:lnSpc>
-              <a:spcBef>
-                <a:spcPts val="0"/>
-              </a:spcBef>
-              <a:spcAft>
-                <a:spcPts val="0"/>
-              </a:spcAft>
-              <a:buClrTx/>
-              <a:buSzTx/>
-              <a:buFontTx/>
-              <a:buNone/>
-              <a:tabLst/>
-              <a:defRPr/>
-            </a:pPr>
-            <a:r>
-              <a:rPr kumimoji="0" lang="fr-FR" sz="3800" b="0" i="0" u="none" strike="noStrike" kern="1200" cap="none" spc="0" normalizeH="0" baseline="0" noProof="0" dirty="0" smtClean="0">
-                <a:ln>
-                  <a:noFill/>
-                </a:ln>
-                <a:solidFill>
-                  <a:prstClr val="black"/>
-                </a:solidFill>
-                <a:effectLst/>
-                <a:uLnTx/>
-                <a:uFillTx/>
-                <a:latin typeface="Helvetica" panose="020B0604020202020204" pitchFamily="34" charset="0"/>
-                <a:ea typeface="+mn-ea"/>
-                <a:cs typeface="Helvetica" panose="020B0604020202020204" pitchFamily="34" charset="0"/>
-              </a:rPr>
-              <a:t>Des ligatures protéiformes</a:t>
-            </a:r>
-            <a:endParaRPr kumimoji="0" lang="en-GB" sz="3800" b="0" i="0" u="none" strike="noStrike" kern="1200" cap="none" spc="0" normalizeH="0" baseline="0" noProof="0" dirty="0">
-              <a:ln>
-                <a:noFill/>
-              </a:ln>
-              <a:solidFill>
-                <a:prstClr val="black"/>
-              </a:solidFill>
-              <a:effectLst/>
-              <a:uLnTx/>
-              <a:uFillTx/>
-              <a:latin typeface="Helvetica" panose="020B0604020202020204" pitchFamily="34" charset="0"/>
-              <a:ea typeface="+mn-ea"/>
-              <a:cs typeface="Helvetica" panose="020B0604020202020204" pitchFamily="34" charset="0"/>
-            </a:endParaRPr>
-          </a:p>
-        </p:txBody>
-      </p:sp>
-      <p:pic>
-        <p:nvPicPr>
           <p:cNvPr id="5" name="Image 4"/>
           <p:cNvPicPr>
             <a:picLocks noChangeAspect="1"/>
@@ -4004,7 +3834,7 @@
         </p:blipFill>
         <p:spPr>
           <a:xfrm>
-            <a:off x="15424722" y="10323358"/>
+            <a:off x="18341847" y="11412799"/>
             <a:ext cx="1456384" cy="620945"/>
           </a:xfrm>
           <a:prstGeom prst="rect">
@@ -4035,16 +3865,12 @@
           <a:lstStyle/>
           <a:p>
             <a:r>
-              <a:rPr lang="fr-FR" sz="2400" dirty="0" smtClean="0">
+              <a:rPr lang="fr-FR" sz="2400" dirty="0">
                 <a:latin typeface="Helvetica" panose="020B0604020202020204" pitchFamily="34" charset="0"/>
                 <a:cs typeface="Helvetica" panose="020B0604020202020204" pitchFamily="34" charset="0"/>
               </a:rPr>
               <a:t>D.G., 158</a:t>
             </a:r>
-            <a:endParaRPr lang="fr-FR" sz="2400" dirty="0">
-              <a:latin typeface="Helvetica" panose="020B0604020202020204" pitchFamily="34" charset="0"/>
-              <a:cs typeface="Helvetica" panose="020B0604020202020204" pitchFamily="34" charset="0"/>
-            </a:endParaRPr>
           </a:p>
         </p:txBody>
       </p:sp>
@@ -4105,32 +3931,25 @@
           <a:lstStyle/>
           <a:p>
             <a:r>
-              <a:rPr lang="fr-FR" sz="2400" dirty="0" smtClean="0">
+              <a:rPr lang="fr-FR" sz="2400" dirty="0">
                 <a:latin typeface="Helvetica" panose="020B0604020202020204" pitchFamily="34" charset="0"/>
                 <a:cs typeface="Helvetica" panose="020B0604020202020204" pitchFamily="34" charset="0"/>
               </a:rPr>
               <a:t>De </a:t>
             </a:r>
             <a:r>
-              <a:rPr lang="fr-FR" sz="2400" dirty="0" err="1" smtClean="0">
+              <a:rPr lang="fr-FR" sz="2400" dirty="0" err="1">
                 <a:latin typeface="Helvetica" panose="020B0604020202020204" pitchFamily="34" charset="0"/>
                 <a:cs typeface="Helvetica" panose="020B0604020202020204" pitchFamily="34" charset="0"/>
               </a:rPr>
               <a:t>Gorris</a:t>
             </a:r>
             <a:r>
-              <a:rPr lang="fr-FR" sz="2400" dirty="0" smtClean="0">
+              <a:rPr lang="fr-FR" sz="2400" dirty="0">
                 <a:latin typeface="Helvetica" panose="020B0604020202020204" pitchFamily="34" charset="0"/>
                 <a:cs typeface="Helvetica" panose="020B0604020202020204" pitchFamily="34" charset="0"/>
               </a:rPr>
-              <a:t>, 1622 [1601]</a:t>
-            </a:r>
-            <a:r>
-              <a:rPr lang="fr-FR" sz="2400" dirty="0" smtClean="0">
-                <a:latin typeface="Helvetica" panose="020B0604020202020204" pitchFamily="34" charset="0"/>
-                <a:cs typeface="Helvetica" panose="020B0604020202020204" pitchFamily="34" charset="0"/>
-              </a:rPr>
-              <a:t>, 158.</a:t>
+              <a:t>, 1622 [1601], 158.</a:t>
             </a:r>
             <a:endParaRPr lang="en-GB" sz="2400" dirty="0">
               <a:latin typeface="Helvetica" panose="020B0604020202020204" pitchFamily="34" charset="0"/>
@@ -4219,7 +4038,7 @@
               <a:defRPr/>
             </a:pPr>
             <a:r>
-              <a:rPr lang="fr-FR" sz="3800" dirty="0" smtClean="0">
+              <a:rPr lang="fr-FR" sz="3800" dirty="0">
                 <a:solidFill>
                   <a:prstClr val="black"/>
                 </a:solidFill>
@@ -4272,7 +4091,7 @@
               </a:lnSpc>
             </a:pPr>
             <a:r>
-              <a:rPr lang="fr-FR" sz="2500" dirty="0" smtClean="0">
+              <a:rPr lang="fr-FR" sz="2500" dirty="0">
                 <a:solidFill>
                   <a:srgbClr val="000000"/>
                 </a:solidFill>
@@ -4282,21 +4101,21 @@
               <a:t>Exemple d’apprentissage de la ligature « </a:t>
             </a:r>
             <a:r>
-              <a:rPr lang="fr-FR" sz="2500" dirty="0" err="1" smtClean="0">
+              <a:rPr lang="fr-FR" sz="2500" dirty="0" err="1">
                 <a:latin typeface="Helvetica" panose="020B0604020202020204" pitchFamily="34" charset="0"/>
                 <a:cs typeface="Helvetica" panose="020B0604020202020204" pitchFamily="34" charset="0"/>
               </a:rPr>
               <a:t>σθ</a:t>
             </a:r>
             <a:r>
-              <a:rPr lang="fr-FR" sz="2500" dirty="0" smtClean="0">
+              <a:rPr lang="fr-FR" sz="2500" dirty="0">
                 <a:latin typeface="Helvetica" panose="020B0604020202020204" pitchFamily="34" charset="0"/>
                 <a:cs typeface="Helvetica" panose="020B0604020202020204" pitchFamily="34" charset="0"/>
               </a:rPr>
               <a:t>αι </a:t>
             </a:r>
             <a:r>
-              <a:rPr lang="fr-FR" sz="2500" dirty="0" smtClean="0">
+              <a:rPr lang="fr-FR" sz="2500" dirty="0">
                 <a:solidFill>
                   <a:srgbClr val="000000"/>
                 </a:solidFill>
@@ -4305,13 +4124,6 @@
               </a:rPr>
               <a:t>», dans Abbyy Finereader.</a:t>
             </a:r>
-            <a:endParaRPr lang="fr-FR" sz="2500" dirty="0">
-              <a:solidFill>
-                <a:srgbClr val="000000"/>
-              </a:solidFill>
-              <a:latin typeface="Helvetica" panose="020B0604020202020204" pitchFamily="34" charset="0"/>
-              <a:cs typeface="Helvetica" panose="020B0604020202020204" pitchFamily="34" charset="0"/>
-            </a:endParaRPr>
           </a:p>
         </p:txBody>
       </p:sp>
@@ -4357,7 +4169,7 @@
         </p:nvSpPr>
         <p:spPr>
           <a:xfrm>
-            <a:off x="16196027" y="11356007"/>
+            <a:off x="17620175" y="11410437"/>
             <a:ext cx="721672" cy="477054"/>
           </a:xfrm>
           <a:prstGeom prst="rect">
@@ -4371,13 +4183,13 @@
           <a:lstStyle/>
           <a:p>
             <a:r>
-              <a:rPr lang="el-GR" sz="2500" dirty="0" smtClean="0">
+              <a:rPr lang="el-GR" sz="2500" dirty="0">
                 <a:latin typeface="Helvetica" panose="020B0604020202020204" pitchFamily="34" charset="0"/>
                 <a:cs typeface="Helvetica" panose="020B0604020202020204" pitchFamily="34" charset="0"/>
               </a:rPr>
               <a:t>τῶν</a:t>
             </a:r>
-            <a:endParaRPr lang="fr-FR" sz="2500" dirty="0" smtClean="0">
+            <a:endParaRPr lang="fr-FR" sz="2500" dirty="0">
               <a:latin typeface="Helvetica" panose="020B0604020202020204" pitchFamily="34" charset="0"/>
               <a:cs typeface="Helvetica" panose="020B0604020202020204" pitchFamily="34" charset="0"/>
             </a:endParaRPr>
@@ -4392,7 +4204,7 @@
         </p:nvSpPr>
         <p:spPr>
           <a:xfrm>
-            <a:off x="15775515" y="12476986"/>
+            <a:off x="16399096" y="12491152"/>
             <a:ext cx="713657" cy="477054"/>
           </a:xfrm>
           <a:prstGeom prst="rect">
@@ -4435,7 +4247,7 @@
         </p:blipFill>
         <p:spPr>
           <a:xfrm>
-            <a:off x="15132246" y="12362191"/>
+            <a:off x="15718246" y="12362191"/>
             <a:ext cx="648002" cy="792000"/>
           </a:xfrm>
           <a:prstGeom prst="rect">
@@ -4451,7 +4263,7 @@
         </p:nvSpPr>
         <p:spPr>
           <a:xfrm>
-            <a:off x="17408852" y="11373685"/>
+            <a:off x="16210641" y="11397879"/>
             <a:ext cx="643125" cy="477054"/>
           </a:xfrm>
           <a:prstGeom prst="rect">
@@ -4494,7 +4306,7 @@
         </p:blipFill>
         <p:spPr>
           <a:xfrm>
-            <a:off x="16937935" y="11205914"/>
+            <a:off x="15706805" y="11252964"/>
             <a:ext cx="497827" cy="792000"/>
           </a:xfrm>
           <a:prstGeom prst="rect">
@@ -4518,7 +4330,7 @@
         </p:blipFill>
         <p:spPr>
           <a:xfrm>
-            <a:off x="18254337" y="12418547"/>
+            <a:off x="19043475" y="12362191"/>
             <a:ext cx="369707" cy="792000"/>
           </a:xfrm>
           <a:prstGeom prst="rect">
@@ -4534,7 +4346,7 @@
         </p:nvSpPr>
         <p:spPr>
           <a:xfrm>
-            <a:off x="18608652" y="12570939"/>
+            <a:off x="19537116" y="12510856"/>
             <a:ext cx="505267" cy="477054"/>
           </a:xfrm>
           <a:prstGeom prst="rect">
@@ -4548,7 +4360,7 @@
           <a:lstStyle/>
           <a:p>
             <a:r>
-              <a:rPr lang="el-GR" sz="2500" dirty="0" smtClean="0">
+              <a:rPr lang="el-GR" sz="2500" dirty="0">
                 <a:latin typeface="Helvetica" panose="020B0604020202020204" pitchFamily="34" charset="0"/>
                 <a:cs typeface="Helvetica" panose="020B0604020202020204" pitchFamily="34" charset="0"/>
               </a:rPr>
@@ -4569,7 +4381,7 @@
         </p:nvSpPr>
         <p:spPr>
           <a:xfrm>
-            <a:off x="18733542" y="11363387"/>
+            <a:off x="14812560" y="12495504"/>
             <a:ext cx="597536" cy="477054"/>
           </a:xfrm>
           <a:prstGeom prst="rect">
@@ -4604,7 +4416,7 @@
         </p:nvSpPr>
         <p:spPr>
           <a:xfrm>
-            <a:off x="17480454" y="12508520"/>
+            <a:off x="18242706" y="12495504"/>
             <a:ext cx="671979" cy="477054"/>
           </a:xfrm>
           <a:prstGeom prst="rect">
@@ -4647,7 +4459,7 @@
         </p:blipFill>
         <p:spPr>
           <a:xfrm>
-            <a:off x="16547487" y="12386036"/>
+            <a:off x="17140807" y="12357489"/>
             <a:ext cx="958737" cy="792000"/>
           </a:xfrm>
           <a:prstGeom prst="rect">
@@ -4671,7 +4483,7 @@
         </p:blipFill>
         <p:spPr>
           <a:xfrm>
-            <a:off x="18211661" y="11179476"/>
+            <a:off x="14255799" y="12349277"/>
             <a:ext cx="457264" cy="800212"/>
           </a:xfrm>
           <a:prstGeom prst="rect">
@@ -4694,7 +4506,7 @@
         </p:blipFill>
         <p:spPr>
           <a:xfrm>
-            <a:off x="15652075" y="11216732"/>
+            <a:off x="17140807" y="11241744"/>
             <a:ext cx="523272" cy="792000"/>
           </a:xfrm>
           <a:prstGeom prst="rect">
@@ -4710,8 +4522,8 @@
         </p:nvSpPr>
         <p:spPr>
           <a:xfrm>
-            <a:off x="16913339" y="10432916"/>
-            <a:ext cx="1450590" cy="477054"/>
+            <a:off x="19907263" y="11292385"/>
+            <a:ext cx="1039580" cy="861774"/>
           </a:xfrm>
           <a:prstGeom prst="rect">
             <a:avLst/>
@@ -4728,7 +4540,20 @@
                 <a:latin typeface="Helvetica" panose="020B0604020202020204" pitchFamily="34" charset="0"/>
                 <a:cs typeface="Helvetica" panose="020B0604020202020204" pitchFamily="34" charset="0"/>
               </a:rPr>
-              <a:t>κατὰ τόπ</a:t>
+              <a:t>κατὰ</a:t>
+            </a:r>
+            <a:endParaRPr lang="fr-FR" sz="2500" dirty="0">
+              <a:latin typeface="Helvetica" panose="020B0604020202020204" pitchFamily="34" charset="0"/>
+              <a:cs typeface="Helvetica" panose="020B0604020202020204" pitchFamily="34" charset="0"/>
+            </a:endParaRPr>
+          </a:p>
+          <a:p>
+            <a:r>
+              <a:rPr lang="el-GR" sz="2500" dirty="0">
+                <a:latin typeface="Helvetica" panose="020B0604020202020204" pitchFamily="34" charset="0"/>
+                <a:cs typeface="Helvetica" panose="020B0604020202020204" pitchFamily="34" charset="0"/>
+              </a:rPr>
+              <a:t>τόπον</a:t>
             </a:r>
             <a:endParaRPr lang="fr-FR" sz="2500" dirty="0">
               <a:latin typeface="Helvetica" panose="020B0604020202020204" pitchFamily="34" charset="0"/>
@@ -4753,7 +4578,7 @@
         </p:blipFill>
         <p:spPr>
           <a:xfrm>
-            <a:off x="14260133" y="11220887"/>
+            <a:off x="14255799" y="11270338"/>
             <a:ext cx="608144" cy="792000"/>
           </a:xfrm>
           <a:prstGeom prst="rect">

</xml_diff>